<commit_message>
Update slide functions: dynamic text/image layouts and larger slide size support
</commit_message>
<xml_diff>
--- a/Persentations/What_is_Generative_AI_.pptx
+++ b/Persentations/What_is_Generative_AI_.pptx
@@ -2,7 +2,7 @@
 <file path=ppt/presentation.xml><?xml version="1.0" encoding="utf-8"?>
 <p:presentation xmlns:a="http://schemas.openxmlformats.org/drawingml/2006/main" xmlns:r="http://schemas.openxmlformats.org/officeDocument/2006/relationships" xmlns:p="http://schemas.openxmlformats.org/presentationml/2006/main" saveSubsetFonts="1">
   <p:sldMasterIdLst>
-    <p:sldMasterId id="2147483771" r:id="rId1"/>
+    <p:sldMasterId id="2147483754" r:id="rId1"/>
   </p:sldMasterIdLst>
   <p:sldIdLst>
     <p:sldId id="256" r:id="rId2"/>
@@ -13,6 +13,10 @@
     <p:sldId id="261" r:id="rId11"/>
     <p:sldId id="262" r:id="rId12"/>
     <p:sldId id="263" r:id="rId13"/>
+    <p:sldId id="264" r:id="rId14"/>
+    <p:sldId id="265" r:id="rId15"/>
+    <p:sldId id="266" r:id="rId16"/>
+    <p:sldId id="267" r:id="rId17"/>
   </p:sldIdLst>
   <p:sldSz cx="12192000" cy="6858000"/>
   <p:notesSz cx="6858000" cy="9144000"/>
@@ -138,7 +142,7 @@
       </p:grpSpPr>
       <p:grpSp>
         <p:nvGrpSpPr>
-          <p:cNvPr id="16" name="Group 15"/>
+          <p:cNvPr id="8" name="Group 7"/>
           <p:cNvGrpSpPr/>
           <p:nvPr/>
         </p:nvGrpSpPr>
@@ -152,7 +156,7 @@
         </p:grpSpPr>
         <p:cxnSp>
           <p:nvCxnSpPr>
-            <p:cNvPr id="19" name="Straight Connector 18"/>
+            <p:cNvPr id="32" name="Straight Connector 31"/>
             <p:cNvCxnSpPr/>
             <p:nvPr/>
           </p:nvCxnSpPr>
@@ -166,8 +170,9 @@
             </a:prstGeom>
             <a:ln w="9525">
               <a:solidFill>
-                <a:schemeClr val="accent1">
-                  <a:alpha val="70000"/>
+                <a:schemeClr val="bg1">
+                  <a:lumMod val="85000"/>
+                  <a:lumOff val="15000"/>
                 </a:schemeClr>
               </a:solidFill>
             </a:ln>
@@ -189,7 +194,7 @@
         </p:cxnSp>
         <p:cxnSp>
           <p:nvCxnSpPr>
-            <p:cNvPr id="20" name="Straight Connector 19"/>
+            <p:cNvPr id="21" name="Straight Connector 20"/>
             <p:cNvCxnSpPr/>
             <p:nvPr/>
           </p:nvCxnSpPr>
@@ -203,8 +208,9 @@
             </a:prstGeom>
             <a:ln w="9525">
               <a:solidFill>
-                <a:schemeClr val="accent1">
-                  <a:alpha val="70000"/>
+                <a:schemeClr val="bg1">
+                  <a:lumMod val="85000"/>
+                  <a:lumOff val="15000"/>
                 </a:schemeClr>
               </a:solidFill>
             </a:ln>
@@ -226,7 +232,7 @@
         </p:cxnSp>
         <p:sp>
           <p:nvSpPr>
-            <p:cNvPr id="21" name="Rectangle 23"/>
+            <p:cNvPr id="24" name="Rectangle 23"/>
             <p:cNvSpPr/>
             <p:nvPr/>
           </p:nvSpPr>
@@ -264,7 +270,7 @@
             </a:custGeom>
             <a:solidFill>
               <a:schemeClr val="accent1">
-                <a:alpha val="36000"/>
+                <a:alpha val="30000"/>
               </a:schemeClr>
             </a:solidFill>
             <a:ln>
@@ -289,7 +295,7 @@
         </p:sp>
         <p:sp>
           <p:nvSpPr>
-            <p:cNvPr id="22" name="Rectangle 25"/>
+            <p:cNvPr id="26" name="Rectangle 25"/>
             <p:cNvSpPr/>
             <p:nvPr/>
           </p:nvSpPr>
@@ -352,7 +358,7 @@
         </p:sp>
         <p:sp>
           <p:nvSpPr>
-            <p:cNvPr id="23" name="Isosceles Triangle 22"/>
+            <p:cNvPr id="27" name="Isosceles Triangle 26"/>
             <p:cNvSpPr/>
             <p:nvPr/>
           </p:nvSpPr>
@@ -367,7 +373,7 @@
               </a:avLst>
             </a:prstGeom>
             <a:solidFill>
-              <a:schemeClr val="accent1">
+              <a:schemeClr val="accent2">
                 <a:alpha val="72000"/>
               </a:schemeClr>
             </a:solidFill>
@@ -393,7 +399,7 @@
         </p:sp>
         <p:sp>
           <p:nvSpPr>
-            <p:cNvPr id="24" name="Rectangle 27"/>
+            <p:cNvPr id="28" name="Rectangle 27"/>
             <p:cNvSpPr/>
             <p:nvPr/>
           </p:nvSpPr>
@@ -430,9 +436,9 @@
               </a:pathLst>
             </a:custGeom>
             <a:solidFill>
-              <a:schemeClr val="accent1">
+              <a:schemeClr val="accent2">
                 <a:lumMod val="75000"/>
-                <a:alpha val="50000"/>
+                <a:alpha val="70000"/>
               </a:schemeClr>
             </a:solidFill>
             <a:ln>
@@ -457,7 +463,7 @@
         </p:sp>
         <p:sp>
           <p:nvSpPr>
-            <p:cNvPr id="25" name="Rectangle 28"/>
+            <p:cNvPr id="29" name="Rectangle 28"/>
             <p:cNvSpPr/>
             <p:nvPr/>
           </p:nvSpPr>
@@ -495,7 +501,8 @@
             </a:custGeom>
             <a:solidFill>
               <a:schemeClr val="accent1">
-                <a:lumMod val="75000"/>
+                <a:lumMod val="60000"/>
+                <a:lumOff val="40000"/>
                 <a:alpha val="70000"/>
               </a:schemeClr>
             </a:solidFill>
@@ -521,7 +528,7 @@
         </p:sp>
         <p:sp>
           <p:nvSpPr>
-            <p:cNvPr id="26" name="Rectangle 29"/>
+            <p:cNvPr id="30" name="Rectangle 29"/>
             <p:cNvSpPr/>
             <p:nvPr/>
           </p:nvSpPr>
@@ -559,7 +566,47 @@
             </a:custGeom>
             <a:solidFill>
               <a:schemeClr val="accent1">
-                <a:lumMod val="50000"/>
+                <a:alpha val="65000"/>
+              </a:schemeClr>
+            </a:solidFill>
+            <a:ln>
+              <a:noFill/>
+            </a:ln>
+            <a:effectLst/>
+          </p:spPr>
+          <p:style>
+            <a:lnRef idx="1">
+              <a:schemeClr val="accent1"/>
+            </a:lnRef>
+            <a:fillRef idx="3">
+              <a:schemeClr val="accent1"/>
+            </a:fillRef>
+            <a:effectRef idx="2">
+              <a:schemeClr val="accent1"/>
+            </a:effectRef>
+            <a:fontRef idx="minor">
+              <a:schemeClr val="lt1"/>
+            </a:fontRef>
+          </p:style>
+        </p:sp>
+        <p:sp>
+          <p:nvSpPr>
+            <p:cNvPr id="31" name="Isosceles Triangle 30"/>
+            <p:cNvSpPr/>
+            <p:nvPr/>
+          </p:nvSpPr>
+          <p:spPr>
+            <a:xfrm>
+              <a:off x="10371666" y="3589867"/>
+              <a:ext cx="1817159" cy="3268133"/>
+            </a:xfrm>
+            <a:prstGeom prst="triangle">
+              <a:avLst>
+                <a:gd name="adj" fmla="val 100000"/>
+              </a:avLst>
+            </a:prstGeom>
+            <a:solidFill>
+              <a:schemeClr val="accent1">
                 <a:alpha val="80000"/>
               </a:schemeClr>
             </a:solidFill>
@@ -585,49 +632,7 @@
         </p:sp>
         <p:sp>
           <p:nvSpPr>
-            <p:cNvPr id="27" name="Isosceles Triangle 26"/>
-            <p:cNvSpPr/>
-            <p:nvPr/>
-          </p:nvSpPr>
-          <p:spPr>
-            <a:xfrm>
-              <a:off x="10371666" y="3589867"/>
-              <a:ext cx="1817159" cy="3268133"/>
-            </a:xfrm>
-            <a:prstGeom prst="triangle">
-              <a:avLst>
-                <a:gd name="adj" fmla="val 100000"/>
-              </a:avLst>
-            </a:prstGeom>
-            <a:solidFill>
-              <a:schemeClr val="accent1">
-                <a:lumMod val="50000"/>
-                <a:alpha val="66000"/>
-              </a:schemeClr>
-            </a:solidFill>
-            <a:ln>
-              <a:noFill/>
-            </a:ln>
-            <a:effectLst/>
-          </p:spPr>
-          <p:style>
-            <a:lnRef idx="1">
-              <a:schemeClr val="accent1"/>
-            </a:lnRef>
-            <a:fillRef idx="3">
-              <a:schemeClr val="accent1"/>
-            </a:fillRef>
-            <a:effectRef idx="2">
-              <a:schemeClr val="accent1"/>
-            </a:effectRef>
-            <a:fontRef idx="minor">
-              <a:schemeClr val="lt1"/>
-            </a:fontRef>
-          </p:style>
-        </p:sp>
-        <p:sp>
-          <p:nvSpPr>
-            <p:cNvPr id="29" name="Isosceles Triangle 28"/>
+            <p:cNvPr id="19" name="Isosceles Triangle 18"/>
             <p:cNvSpPr/>
             <p:nvPr/>
           </p:nvSpPr>
@@ -643,8 +648,7 @@
             </a:prstGeom>
             <a:solidFill>
               <a:schemeClr val="accent1">
-                <a:lumMod val="75000"/>
-                <a:alpha val="70000"/>
+                <a:alpha val="85000"/>
               </a:schemeClr>
             </a:solidFill>
             <a:ln>
@@ -692,9 +696,7 @@
             <a:lvl1pPr algn="r">
               <a:defRPr sz="5400">
                 <a:solidFill>
-                  <a:schemeClr val="accent1">
-                    <a:lumMod val="75000"/>
-                  </a:schemeClr>
+                  <a:schemeClr val="accent1"/>
                 </a:solidFill>
               </a:defRPr>
             </a:lvl1pPr>
@@ -896,7 +898,7 @@
     </p:spTree>
     <p:extLst>
       <p:ext uri="{BB962C8B-B14F-4D97-AF65-F5344CB8AC3E}">
-        <p14:creationId xmlns:p14="http://schemas.microsoft.com/office/powerpoint/2010/main" val="3491873008"/>
+        <p14:creationId xmlns:p14="http://schemas.microsoft.com/office/powerpoint/2010/main" val="1095244993"/>
       </p:ext>
     </p:extLst>
   </p:cSld>
@@ -1147,7 +1149,7 @@
     </p:spTree>
     <p:extLst>
       <p:ext uri="{BB962C8B-B14F-4D97-AF65-F5344CB8AC3E}">
-        <p14:creationId xmlns:p14="http://schemas.microsoft.com/office/powerpoint/2010/main" val="1342096447"/>
+        <p14:creationId xmlns:p14="http://schemas.microsoft.com/office/powerpoint/2010/main" val="3400309581"/>
       </p:ext>
     </p:extLst>
   </p:cSld>
@@ -1460,7 +1462,7 @@
       </p:sp>
       <p:sp>
         <p:nvSpPr>
-          <p:cNvPr id="24" name="TextBox 23"/>
+          <p:cNvPr id="20" name="TextBox 19"/>
           <p:cNvSpPr txBox="1"/>
           <p:nvPr/>
         </p:nvSpPr>
@@ -1498,7 +1500,7 @@
       </p:sp>
       <p:sp>
         <p:nvSpPr>
-          <p:cNvPr id="25" name="TextBox 24"/>
+          <p:cNvPr id="22" name="TextBox 21"/>
           <p:cNvSpPr txBox="1"/>
           <p:nvPr/>
         </p:nvSpPr>
@@ -1537,7 +1539,7 @@
     </p:spTree>
     <p:extLst>
       <p:ext uri="{BB962C8B-B14F-4D97-AF65-F5344CB8AC3E}">
-        <p14:creationId xmlns:p14="http://schemas.microsoft.com/office/powerpoint/2010/main" val="2108637912"/>
+        <p14:creationId xmlns:p14="http://schemas.microsoft.com/office/powerpoint/2010/main" val="295624758"/>
       </p:ext>
     </p:extLst>
   </p:cSld>
@@ -1788,7 +1790,7 @@
     </p:spTree>
     <p:extLst>
       <p:ext uri="{BB962C8B-B14F-4D97-AF65-F5344CB8AC3E}">
-        <p14:creationId xmlns:p14="http://schemas.microsoft.com/office/powerpoint/2010/main" val="2954649655"/>
+        <p14:creationId xmlns:p14="http://schemas.microsoft.com/office/powerpoint/2010/main" val="3220309679"/>
       </p:ext>
     </p:extLst>
   </p:cSld>
@@ -2178,7 +2180,7 @@
     </p:spTree>
     <p:extLst>
       <p:ext uri="{BB962C8B-B14F-4D97-AF65-F5344CB8AC3E}">
-        <p14:creationId xmlns:p14="http://schemas.microsoft.com/office/powerpoint/2010/main" val="3979961589"/>
+        <p14:creationId xmlns:p14="http://schemas.microsoft.com/office/powerpoint/2010/main" val="934270300"/>
       </p:ext>
     </p:extLst>
   </p:cSld>
@@ -2489,7 +2491,7 @@
     </p:spTree>
     <p:extLst>
       <p:ext uri="{BB962C8B-B14F-4D97-AF65-F5344CB8AC3E}">
-        <p14:creationId xmlns:p14="http://schemas.microsoft.com/office/powerpoint/2010/main" val="2009529358"/>
+        <p14:creationId xmlns:p14="http://schemas.microsoft.com/office/powerpoint/2010/main" val="3031123509"/>
       </p:ext>
     </p:extLst>
   </p:cSld>
@@ -2659,7 +2661,7 @@
     </p:spTree>
     <p:extLst>
       <p:ext uri="{BB962C8B-B14F-4D97-AF65-F5344CB8AC3E}">
-        <p14:creationId xmlns:p14="http://schemas.microsoft.com/office/powerpoint/2010/main" val="2067344452"/>
+        <p14:creationId xmlns:p14="http://schemas.microsoft.com/office/powerpoint/2010/main" val="4217691573"/>
       </p:ext>
     </p:extLst>
   </p:cSld>
@@ -2839,7 +2841,7 @@
     </p:spTree>
     <p:extLst>
       <p:ext uri="{BB962C8B-B14F-4D97-AF65-F5344CB8AC3E}">
-        <p14:creationId xmlns:p14="http://schemas.microsoft.com/office/powerpoint/2010/main" val="1545429006"/>
+        <p14:creationId xmlns:p14="http://schemas.microsoft.com/office/powerpoint/2010/main" val="642063997"/>
       </p:ext>
     </p:extLst>
   </p:cSld>
@@ -2878,8 +2880,14 @@
         </p:nvSpPr>
         <p:spPr/>
         <p:txBody>
-          <a:bodyPr/>
-          <a:lstStyle/>
+          <a:bodyPr>
+            <a:normAutofit/>
+          </a:bodyPr>
+          <a:lstStyle>
+            <a:lvl1pPr>
+              <a:defRPr sz="3600"/>
+            </a:lvl1pPr>
+          </a:lstStyle>
           <a:p>
             <a:r>
               <a:rPr lang="en-US"/>
@@ -3009,7 +3017,7 @@
     </p:spTree>
     <p:extLst>
       <p:ext uri="{BB962C8B-B14F-4D97-AF65-F5344CB8AC3E}">
-        <p14:creationId xmlns:p14="http://schemas.microsoft.com/office/powerpoint/2010/main" val="2990337980"/>
+        <p14:creationId xmlns:p14="http://schemas.microsoft.com/office/powerpoint/2010/main" val="840414842"/>
       </p:ext>
     </p:extLst>
   </p:cSld>
@@ -3256,7 +3264,7 @@
     </p:spTree>
     <p:extLst>
       <p:ext uri="{BB962C8B-B14F-4D97-AF65-F5344CB8AC3E}">
-        <p14:creationId xmlns:p14="http://schemas.microsoft.com/office/powerpoint/2010/main" val="2872350163"/>
+        <p14:creationId xmlns:p14="http://schemas.microsoft.com/office/powerpoint/2010/main" val="2361445393"/>
       </p:ext>
     </p:extLst>
   </p:cSld>
@@ -3488,7 +3496,7 @@
     </p:spTree>
     <p:extLst>
       <p:ext uri="{BB962C8B-B14F-4D97-AF65-F5344CB8AC3E}">
-        <p14:creationId xmlns:p14="http://schemas.microsoft.com/office/powerpoint/2010/main" val="2738248333"/>
+        <p14:creationId xmlns:p14="http://schemas.microsoft.com/office/powerpoint/2010/main" val="1271966166"/>
       </p:ext>
     </p:extLst>
   </p:cSld>
@@ -3862,7 +3870,7 @@
     </p:spTree>
     <p:extLst>
       <p:ext uri="{BB962C8B-B14F-4D97-AF65-F5344CB8AC3E}">
-        <p14:creationId xmlns:p14="http://schemas.microsoft.com/office/powerpoint/2010/main" val="2095076526"/>
+        <p14:creationId xmlns:p14="http://schemas.microsoft.com/office/powerpoint/2010/main" val="3841238954"/>
       </p:ext>
     </p:extLst>
   </p:cSld>
@@ -3985,7 +3993,7 @@
     </p:spTree>
     <p:extLst>
       <p:ext uri="{BB962C8B-B14F-4D97-AF65-F5344CB8AC3E}">
-        <p14:creationId xmlns:p14="http://schemas.microsoft.com/office/powerpoint/2010/main" val="4043494352"/>
+        <p14:creationId xmlns:p14="http://schemas.microsoft.com/office/powerpoint/2010/main" val="2154582429"/>
       </p:ext>
     </p:extLst>
   </p:cSld>
@@ -4080,7 +4088,7 @@
     </p:spTree>
     <p:extLst>
       <p:ext uri="{BB962C8B-B14F-4D97-AF65-F5344CB8AC3E}">
-        <p14:creationId xmlns:p14="http://schemas.microsoft.com/office/powerpoint/2010/main" val="1397077255"/>
+        <p14:creationId xmlns:p14="http://schemas.microsoft.com/office/powerpoint/2010/main" val="4080573247"/>
       </p:ext>
     </p:extLst>
   </p:cSld>
@@ -4335,7 +4343,7 @@
     </p:spTree>
     <p:extLst>
       <p:ext uri="{BB962C8B-B14F-4D97-AF65-F5344CB8AC3E}">
-        <p14:creationId xmlns:p14="http://schemas.microsoft.com/office/powerpoint/2010/main" val="94061886"/>
+        <p14:creationId xmlns:p14="http://schemas.microsoft.com/office/powerpoint/2010/main" val="1864172126"/>
       </p:ext>
     </p:extLst>
   </p:cSld>
@@ -4598,7 +4606,7 @@
     </p:spTree>
     <p:extLst>
       <p:ext uri="{BB962C8B-B14F-4D97-AF65-F5344CB8AC3E}">
-        <p14:creationId xmlns:p14="http://schemas.microsoft.com/office/powerpoint/2010/main" val="750344586"/>
+        <p14:creationId xmlns:p14="http://schemas.microsoft.com/office/powerpoint/2010/main" val="228603690"/>
       </p:ext>
     </p:extLst>
   </p:cSld>
@@ -4613,7 +4621,7 @@
   <p:cSld>
     <p:bg>
       <p:bgRef idx="1001">
-        <a:schemeClr val="bg1"/>
+        <a:schemeClr val="bg2"/>
       </p:bgRef>
     </p:bg>
     <p:spTree>
@@ -4632,7 +4640,7 @@
       </p:grpSpPr>
       <p:grpSp>
         <p:nvGrpSpPr>
-          <p:cNvPr id="29" name="Group 28"/>
+          <p:cNvPr id="8" name="Group 7"/>
           <p:cNvGrpSpPr/>
           <p:nvPr/>
         </p:nvGrpSpPr>
@@ -4646,7 +4654,7 @@
         </p:grpSpPr>
         <p:cxnSp>
           <p:nvCxnSpPr>
-            <p:cNvPr id="19" name="Straight Connector 18"/>
+            <p:cNvPr id="20" name="Straight Connector 19"/>
             <p:cNvCxnSpPr/>
             <p:nvPr/>
           </p:nvCxnSpPr>
@@ -4660,8 +4668,9 @@
             </a:prstGeom>
             <a:ln w="9525">
               <a:solidFill>
-                <a:schemeClr val="accent1">
-                  <a:alpha val="70000"/>
+                <a:schemeClr val="bg1">
+                  <a:lumMod val="85000"/>
+                  <a:lumOff val="15000"/>
                 </a:schemeClr>
               </a:solidFill>
             </a:ln>
@@ -4683,7 +4692,7 @@
         </p:cxnSp>
         <p:cxnSp>
           <p:nvCxnSpPr>
-            <p:cNvPr id="20" name="Straight Connector 19"/>
+            <p:cNvPr id="21" name="Straight Connector 20"/>
             <p:cNvCxnSpPr/>
             <p:nvPr/>
           </p:nvCxnSpPr>
@@ -4697,8 +4706,9 @@
             </a:prstGeom>
             <a:ln w="9525">
               <a:solidFill>
-                <a:schemeClr val="accent1">
-                  <a:alpha val="70000"/>
+                <a:schemeClr val="bg1">
+                  <a:lumMod val="85000"/>
+                  <a:lumOff val="15000"/>
                 </a:schemeClr>
               </a:solidFill>
             </a:ln>
@@ -4720,7 +4730,7 @@
         </p:cxnSp>
         <p:sp>
           <p:nvSpPr>
-            <p:cNvPr id="21" name="Rectangle 23"/>
+            <p:cNvPr id="22" name="Rectangle 23"/>
             <p:cNvSpPr/>
             <p:nvPr/>
           </p:nvSpPr>
@@ -4758,7 +4768,7 @@
             </a:custGeom>
             <a:solidFill>
               <a:schemeClr val="accent1">
-                <a:alpha val="36000"/>
+                <a:alpha val="30000"/>
               </a:schemeClr>
             </a:solidFill>
             <a:ln>
@@ -4783,7 +4793,7 @@
         </p:sp>
         <p:sp>
           <p:nvSpPr>
-            <p:cNvPr id="22" name="Rectangle 25"/>
+            <p:cNvPr id="23" name="Rectangle 25"/>
             <p:cNvSpPr/>
             <p:nvPr/>
           </p:nvSpPr>
@@ -4846,7 +4856,7 @@
         </p:sp>
         <p:sp>
           <p:nvSpPr>
-            <p:cNvPr id="23" name="Isosceles Triangle 22"/>
+            <p:cNvPr id="24" name="Isosceles Triangle 23"/>
             <p:cNvSpPr/>
             <p:nvPr/>
           </p:nvSpPr>
@@ -4861,7 +4871,7 @@
               </a:avLst>
             </a:prstGeom>
             <a:solidFill>
-              <a:schemeClr val="accent1">
+              <a:schemeClr val="accent2">
                 <a:alpha val="72000"/>
               </a:schemeClr>
             </a:solidFill>
@@ -4887,7 +4897,7 @@
         </p:sp>
         <p:sp>
           <p:nvSpPr>
-            <p:cNvPr id="24" name="Rectangle 27"/>
+            <p:cNvPr id="25" name="Rectangle 27"/>
             <p:cNvSpPr/>
             <p:nvPr/>
           </p:nvSpPr>
@@ -4924,9 +4934,9 @@
               </a:pathLst>
             </a:custGeom>
             <a:solidFill>
-              <a:schemeClr val="accent1">
+              <a:schemeClr val="accent2">
                 <a:lumMod val="75000"/>
-                <a:alpha val="50000"/>
+                <a:alpha val="70000"/>
               </a:schemeClr>
             </a:solidFill>
             <a:ln>
@@ -4951,7 +4961,7 @@
         </p:sp>
         <p:sp>
           <p:nvSpPr>
-            <p:cNvPr id="25" name="Rectangle 28"/>
+            <p:cNvPr id="26" name="Rectangle 28"/>
             <p:cNvSpPr/>
             <p:nvPr/>
           </p:nvSpPr>
@@ -4989,7 +4999,8 @@
             </a:custGeom>
             <a:solidFill>
               <a:schemeClr val="accent1">
-                <a:lumMod val="75000"/>
+                <a:lumMod val="60000"/>
+                <a:lumOff val="40000"/>
                 <a:alpha val="70000"/>
               </a:schemeClr>
             </a:solidFill>
@@ -5015,7 +5026,7 @@
         </p:sp>
         <p:sp>
           <p:nvSpPr>
-            <p:cNvPr id="26" name="Rectangle 29"/>
+            <p:cNvPr id="27" name="Rectangle 29"/>
             <p:cNvSpPr/>
             <p:nvPr/>
           </p:nvSpPr>
@@ -5053,50 +5064,7 @@
             </a:custGeom>
             <a:solidFill>
               <a:schemeClr val="accent1">
-                <a:lumMod val="50000"/>
-                <a:alpha val="80000"/>
-              </a:schemeClr>
-            </a:solidFill>
-            <a:ln>
-              <a:noFill/>
-            </a:ln>
-            <a:effectLst/>
-          </p:spPr>
-          <p:style>
-            <a:lnRef idx="1">
-              <a:schemeClr val="accent1"/>
-            </a:lnRef>
-            <a:fillRef idx="3">
-              <a:schemeClr val="accent1"/>
-            </a:fillRef>
-            <a:effectRef idx="2">
-              <a:schemeClr val="accent1"/>
-            </a:effectRef>
-            <a:fontRef idx="minor">
-              <a:schemeClr val="lt1"/>
-            </a:fontRef>
-          </p:style>
-        </p:sp>
-        <p:sp>
-          <p:nvSpPr>
-            <p:cNvPr id="27" name="Isosceles Triangle 26"/>
-            <p:cNvSpPr/>
-            <p:nvPr/>
-          </p:nvSpPr>
-          <p:spPr>
-            <a:xfrm>
-              <a:off x="10371666" y="3589867"/>
-              <a:ext cx="1817159" cy="3268133"/>
-            </a:xfrm>
-            <a:prstGeom prst="triangle">
-              <a:avLst>
-                <a:gd name="adj" fmla="val 100000"/>
-              </a:avLst>
-            </a:prstGeom>
-            <a:solidFill>
-              <a:schemeClr val="accent1">
-                <a:lumMod val="50000"/>
-                <a:alpha val="66000"/>
+                <a:alpha val="65000"/>
               </a:schemeClr>
             </a:solidFill>
             <a:ln>
@@ -5127,6 +5095,47 @@
           </p:nvSpPr>
           <p:spPr>
             <a:xfrm>
+              <a:off x="10371666" y="3589867"/>
+              <a:ext cx="1817159" cy="3268133"/>
+            </a:xfrm>
+            <a:prstGeom prst="triangle">
+              <a:avLst>
+                <a:gd name="adj" fmla="val 100000"/>
+              </a:avLst>
+            </a:prstGeom>
+            <a:solidFill>
+              <a:schemeClr val="accent1">
+                <a:alpha val="80000"/>
+              </a:schemeClr>
+            </a:solidFill>
+            <a:ln>
+              <a:noFill/>
+            </a:ln>
+            <a:effectLst/>
+          </p:spPr>
+          <p:style>
+            <a:lnRef idx="1">
+              <a:schemeClr val="accent1"/>
+            </a:lnRef>
+            <a:fillRef idx="3">
+              <a:schemeClr val="accent1"/>
+            </a:fillRef>
+            <a:effectRef idx="2">
+              <a:schemeClr val="accent1"/>
+            </a:effectRef>
+            <a:fontRef idx="minor">
+              <a:schemeClr val="lt1"/>
+            </a:fontRef>
+          </p:style>
+        </p:sp>
+        <p:sp>
+          <p:nvSpPr>
+            <p:cNvPr id="29" name="Isosceles Triangle 28"/>
+            <p:cNvSpPr/>
+            <p:nvPr/>
+          </p:nvSpPr>
+          <p:spPr>
+            <a:xfrm>
               <a:off x="0" y="4013200"/>
               <a:ext cx="448733" cy="2844800"/>
             </a:xfrm>
@@ -5137,8 +5146,7 @@
             </a:prstGeom>
             <a:solidFill>
               <a:schemeClr val="accent1">
-                <a:lumMod val="75000"/>
-                <a:alpha val="70000"/>
+                <a:alpha val="85000"/>
               </a:schemeClr>
             </a:solidFill>
             <a:ln>
@@ -5360,9 +5368,7 @@
             <a:lvl1pPr algn="r">
               <a:defRPr sz="900">
                 <a:solidFill>
-                  <a:schemeClr val="accent1">
-                    <a:lumMod val="75000"/>
-                  </a:schemeClr>
+                  <a:schemeClr val="accent1"/>
                 </a:solidFill>
               </a:defRPr>
             </a:lvl1pPr>
@@ -5379,28 +5385,28 @@
     </p:spTree>
     <p:extLst>
       <p:ext uri="{BB962C8B-B14F-4D97-AF65-F5344CB8AC3E}">
-        <p14:creationId xmlns:p14="http://schemas.microsoft.com/office/powerpoint/2010/main" val="4034526878"/>
+        <p14:creationId xmlns:p14="http://schemas.microsoft.com/office/powerpoint/2010/main" val="724208102"/>
       </p:ext>
     </p:extLst>
   </p:cSld>
   <p:clrMap bg1="dk1" tx1="lt1" bg2="dk2" tx2="lt2" accent1="accent1" accent2="accent2" accent3="accent3" accent4="accent4" accent5="accent5" accent6="accent6" hlink="hlink" folHlink="folHlink"/>
   <p:sldLayoutIdLst>
-    <p:sldLayoutId id="2147483772" r:id="rId1"/>
-    <p:sldLayoutId id="2147483773" r:id="rId2"/>
-    <p:sldLayoutId id="2147483774" r:id="rId3"/>
-    <p:sldLayoutId id="2147483775" r:id="rId4"/>
-    <p:sldLayoutId id="2147483776" r:id="rId5"/>
-    <p:sldLayoutId id="2147483777" r:id="rId6"/>
-    <p:sldLayoutId id="2147483778" r:id="rId7"/>
-    <p:sldLayoutId id="2147483779" r:id="rId8"/>
-    <p:sldLayoutId id="2147483780" r:id="rId9"/>
-    <p:sldLayoutId id="2147483781" r:id="rId10"/>
-    <p:sldLayoutId id="2147483782" r:id="rId11"/>
-    <p:sldLayoutId id="2147483783" r:id="rId12"/>
-    <p:sldLayoutId id="2147483784" r:id="rId13"/>
-    <p:sldLayoutId id="2147483785" r:id="rId14"/>
-    <p:sldLayoutId id="2147483786" r:id="rId15"/>
-    <p:sldLayoutId id="2147483787" r:id="rId16"/>
+    <p:sldLayoutId id="2147483755" r:id="rId1"/>
+    <p:sldLayoutId id="2147483756" r:id="rId2"/>
+    <p:sldLayoutId id="2147483757" r:id="rId3"/>
+    <p:sldLayoutId id="2147483758" r:id="rId4"/>
+    <p:sldLayoutId id="2147483759" r:id="rId5"/>
+    <p:sldLayoutId id="2147483760" r:id="rId6"/>
+    <p:sldLayoutId id="2147483761" r:id="rId7"/>
+    <p:sldLayoutId id="2147483762" r:id="rId8"/>
+    <p:sldLayoutId id="2147483763" r:id="rId9"/>
+    <p:sldLayoutId id="2147483764" r:id="rId10"/>
+    <p:sldLayoutId id="2147483765" r:id="rId11"/>
+    <p:sldLayoutId id="2147483766" r:id="rId12"/>
+    <p:sldLayoutId id="2147483767" r:id="rId13"/>
+    <p:sldLayoutId id="2147483768" r:id="rId14"/>
+    <p:sldLayoutId id="2147483769" r:id="rId15"/>
+    <p:sldLayoutId id="2147483770" r:id="rId16"/>
   </p:sldLayoutIdLst>
   <p:txStyles>
     <p:titleStyle>
@@ -5411,9 +5417,7 @@
         <a:buNone/>
         <a:defRPr sz="3600" kern="1200">
           <a:solidFill>
-            <a:schemeClr val="accent1">
-              <a:lumMod val="75000"/>
-            </a:schemeClr>
+            <a:schemeClr val="accent1"/>
           </a:solidFill>
           <a:latin typeface="+mj-lt"/>
           <a:ea typeface="+mj-ea"/>
@@ -5486,9 +5490,7 @@
           <a:spcPts val="0"/>
         </a:spcAft>
         <a:buClr>
-          <a:schemeClr val="accent1">
-            <a:lumMod val="75000"/>
-          </a:schemeClr>
+          <a:schemeClr val="accent1"/>
         </a:buClr>
         <a:buSzPct val="80000"/>
         <a:buFont typeface="Wingdings 3" charset="2"/>
@@ -5513,9 +5515,7 @@
           <a:spcPts val="0"/>
         </a:spcAft>
         <a:buClr>
-          <a:schemeClr val="accent1">
-            <a:lumMod val="75000"/>
-          </a:schemeClr>
+          <a:schemeClr val="accent1"/>
         </a:buClr>
         <a:buSzPct val="80000"/>
         <a:buFont typeface="Wingdings 3" charset="2"/>
@@ -5540,9 +5540,7 @@
           <a:spcPts val="0"/>
         </a:spcAft>
         <a:buClr>
-          <a:schemeClr val="accent1">
-            <a:lumMod val="75000"/>
-          </a:schemeClr>
+          <a:schemeClr val="accent1"/>
         </a:buClr>
         <a:buSzPct val="80000"/>
         <a:buFont typeface="Wingdings 3" charset="2"/>
@@ -5567,9 +5565,7 @@
           <a:spcPts val="0"/>
         </a:spcAft>
         <a:buClr>
-          <a:schemeClr val="accent1">
-            <a:lumMod val="75000"/>
-          </a:schemeClr>
+          <a:schemeClr val="accent1"/>
         </a:buClr>
         <a:buSzPct val="80000"/>
         <a:buFont typeface="Wingdings 3" charset="2"/>
@@ -5594,9 +5590,7 @@
           <a:spcPts val="0"/>
         </a:spcAft>
         <a:buClr>
-          <a:schemeClr val="accent1">
-            <a:lumMod val="75000"/>
-          </a:schemeClr>
+          <a:schemeClr val="accent1"/>
         </a:buClr>
         <a:buSzPct val="80000"/>
         <a:buFont typeface="Wingdings 3" charset="2"/>
@@ -5621,9 +5615,7 @@
           <a:spcPts val="0"/>
         </a:spcAft>
         <a:buClr>
-          <a:schemeClr val="accent1">
-            <a:lumMod val="75000"/>
-          </a:schemeClr>
+          <a:schemeClr val="accent1"/>
         </a:buClr>
         <a:buSzPct val="80000"/>
         <a:buFont typeface="Wingdings 3" charset="2"/>
@@ -5648,9 +5640,7 @@
           <a:spcPts val="0"/>
         </a:spcAft>
         <a:buClr>
-          <a:schemeClr val="accent1">
-            <a:lumMod val="75000"/>
-          </a:schemeClr>
+          <a:schemeClr val="accent1"/>
         </a:buClr>
         <a:buSzPct val="80000"/>
         <a:buFont typeface="Wingdings 3" charset="2"/>
@@ -5675,9 +5665,7 @@
           <a:spcPts val="0"/>
         </a:spcAft>
         <a:buClr>
-          <a:schemeClr val="accent1">
-            <a:lumMod val="75000"/>
-          </a:schemeClr>
+          <a:schemeClr val="accent1"/>
         </a:buClr>
         <a:buSzPct val="80000"/>
         <a:buFont typeface="Wingdings 3" charset="2"/>
@@ -5702,9 +5690,7 @@
           <a:spcPts val="0"/>
         </a:spcAft>
         <a:buClr>
-          <a:schemeClr val="accent1">
-            <a:lumMod val="75000"/>
-          </a:schemeClr>
+          <a:schemeClr val="accent1"/>
         </a:buClr>
         <a:buSzPct val="80000"/>
         <a:buFont typeface="Wingdings 3" charset="2"/>
@@ -5881,6 +5867,326 @@
 </p:sld>
 </file>
 
+<file path=ppt/slides/slide10.xml><?xml version="1.0" encoding="utf-8"?>
+<p:sld xmlns:a="http://schemas.openxmlformats.org/drawingml/2006/main" xmlns:p="http://schemas.openxmlformats.org/presentationml/2006/main" xmlns:r="http://schemas.openxmlformats.org/officeDocument/2006/relationships">
+  <p:cSld>
+    <p:spTree>
+      <p:nvGrpSpPr>
+        <p:cNvPr id="1" name=""/>
+        <p:cNvGrpSpPr/>
+        <p:nvPr/>
+      </p:nvGrpSpPr>
+      <p:grpSpPr/>
+      <p:sp>
+        <p:nvSpPr>
+          <p:cNvPr id="2" name="Title 1"/>
+          <p:cNvSpPr>
+            <a:spLocks noGrp="1"/>
+          </p:cNvSpPr>
+          <p:nvPr>
+            <p:ph type="title"/>
+          </p:nvPr>
+        </p:nvSpPr>
+        <p:spPr/>
+        <p:txBody>
+          <a:bodyPr/>
+          <a:lstStyle/>
+          <a:p>
+            <a:r>
+              <a:t>Challenges and Limitations</a:t>
+            </a:r>
+          </a:p>
+        </p:txBody>
+      </p:sp>
+      <p:sp>
+        <p:nvSpPr>
+          <p:cNvPr id="3" name="Content Placeholder 2"/>
+          <p:cNvSpPr>
+            <a:spLocks noGrp="1"/>
+          </p:cNvSpPr>
+          <p:nvPr>
+            <p:ph idx="1"/>
+          </p:nvPr>
+        </p:nvSpPr>
+        <p:spPr/>
+        <p:txBody>
+          <a:bodyPr wrap="square">
+            <a:normAutofit/>
+          </a:bodyPr>
+          <a:lstStyle/>
+          <a:p>
+            <a:pPr/>
+            <a:r>
+              <a:t>Lack of Understanding</a:t>
+            </a:r>
+          </a:p>
+          <a:p>
+            <a:pPr/>
+            <a:r>
+              <a:t>Limited Control</a:t>
+            </a:r>
+          </a:p>
+          <a:p>
+            <a:pPr/>
+            <a:r>
+              <a:t>Bias and Fairness</a:t>
+            </a:r>
+          </a:p>
+          <a:p>
+            <a:pPr/>
+            <a:r>
+              <a:t>Intellectual Property</a:t>
+            </a:r>
+          </a:p>
+          <a:p>
+            <a:pPr/>
+            <a:r>
+              <a:t>Security Risks</a:t>
+            </a:r>
+          </a:p>
+          <a:p>
+            <a:pPr/>
+            <a:r>
+              <a:t>Transparency and Explainability</a:t>
+            </a:r>
+          </a:p>
+        </p:txBody>
+      </p:sp>
+    </p:spTree>
+  </p:cSld>
+  <p:clrMapOvr>
+    <a:masterClrMapping/>
+  </p:clrMapOvr>
+</p:sld>
+</file>
+
+<file path=ppt/slides/slide11.xml><?xml version="1.0" encoding="utf-8"?>
+<p:sld xmlns:a="http://schemas.openxmlformats.org/drawingml/2006/main" xmlns:p="http://schemas.openxmlformats.org/presentationml/2006/main" xmlns:r="http://schemas.openxmlformats.org/officeDocument/2006/relationships">
+  <p:cSld>
+    <p:spTree>
+      <p:nvGrpSpPr>
+        <p:cNvPr id="1" name=""/>
+        <p:cNvGrpSpPr/>
+        <p:nvPr/>
+      </p:nvGrpSpPr>
+      <p:grpSpPr/>
+      <p:sp>
+        <p:nvSpPr>
+          <p:cNvPr id="2" name="TextBox 1"/>
+          <p:cNvSpPr txBox="1"/>
+          <p:nvPr/>
+        </p:nvSpPr>
+        <p:spPr>
+          <a:xfrm>
+            <a:off x="457200" y="457200"/>
+            <a:ext cx="8229600" cy="914400"/>
+          </a:xfrm>
+          <a:prstGeom prst="rect">
+            <a:avLst/>
+          </a:prstGeom>
+          <a:noFill/>
+        </p:spPr>
+        <p:txBody>
+          <a:bodyPr wrap="none">
+            <a:spAutoFit/>
+          </a:bodyPr>
+          <a:lstStyle/>
+          <a:p>
+            <a:pPr algn="ctr">
+              <a:defRPr sz="3200" b="1"/>
+            </a:pPr>
+            <a:r>
+              <a:t>Conclusion</a:t>
+            </a:r>
+          </a:p>
+        </p:txBody>
+      </p:sp>
+      <p:sp>
+        <p:nvSpPr>
+          <p:cNvPr id="3" name="TextBox 2"/>
+          <p:cNvSpPr txBox="1"/>
+          <p:nvPr/>
+        </p:nvSpPr>
+        <p:spPr>
+          <a:xfrm>
+            <a:off x="914400" y="1828800"/>
+            <a:ext cx="7315200" cy="3657600"/>
+          </a:xfrm>
+          <a:prstGeom prst="rect">
+            <a:avLst/>
+          </a:prstGeom>
+          <a:noFill/>
+        </p:spPr>
+        <p:txBody>
+          <a:bodyPr wrap="square" anchor="ctr">
+            <a:spAutoFit/>
+          </a:bodyPr>
+          <a:lstStyle/>
+          <a:p>
+            <a:pPr algn="ctr">
+              <a:defRPr sz="2000"/>
+            </a:pPr>
+            <a:r>
+              <a:t>Recap of Key Points</a:t>
+            </a:r>
+          </a:p>
+          <a:p>
+            <a:pPr algn="ctr">
+              <a:defRPr sz="2000"/>
+            </a:pPr>
+            <a:r>
+              <a:t>Future Directions</a:t>
+            </a:r>
+          </a:p>
+          <a:p>
+            <a:pPr algn="ctr">
+              <a:defRPr sz="2000"/>
+            </a:pPr>
+            <a:r>
+              <a:t>Potential Impact</a:t>
+            </a:r>
+          </a:p>
+        </p:txBody>
+      </p:sp>
+    </p:spTree>
+  </p:cSld>
+  <p:clrMapOvr>
+    <a:masterClrMapping/>
+  </p:clrMapOvr>
+</p:sld>
+</file>
+
+<file path=ppt/slides/slide12.xml><?xml version="1.0" encoding="utf-8"?>
+<p:sld xmlns:a="http://schemas.openxmlformats.org/drawingml/2006/main" xmlns:p="http://schemas.openxmlformats.org/presentationml/2006/main" xmlns:r="http://schemas.openxmlformats.org/officeDocument/2006/relationships">
+  <p:cSld>
+    <p:spTree>
+      <p:nvGrpSpPr>
+        <p:cNvPr id="1" name=""/>
+        <p:cNvGrpSpPr/>
+        <p:nvPr/>
+      </p:nvGrpSpPr>
+      <p:grpSpPr/>
+      <p:sp>
+        <p:nvSpPr>
+          <p:cNvPr id="2" name="Rectangle 1"/>
+          <p:cNvSpPr/>
+          <p:nvPr/>
+        </p:nvSpPr>
+        <p:spPr>
+          <a:xfrm>
+            <a:off x="0" y="0"/>
+            <a:ext cx="12192000" cy="6858000"/>
+          </a:xfrm>
+          <a:prstGeom prst="rect">
+            <a:avLst/>
+          </a:prstGeom>
+          <a:solidFill>
+            <a:srgbClr val="191970"/>
+          </a:solidFill>
+          <a:ln>
+            <a:noFill/>
+          </a:ln>
+        </p:spPr>
+        <p:style>
+          <a:lnRef idx="1">
+            <a:schemeClr val="accent1"/>
+          </a:lnRef>
+          <a:fillRef idx="3">
+            <a:schemeClr val="accent1"/>
+          </a:fillRef>
+          <a:effectRef idx="2">
+            <a:schemeClr val="accent1"/>
+          </a:effectRef>
+          <a:fontRef idx="minor">
+            <a:schemeClr val="lt1"/>
+          </a:fontRef>
+        </p:style>
+        <p:txBody>
+          <a:bodyPr rtlCol="0" anchor="ctr"/>
+          <a:lstStyle/>
+          <a:p>
+            <a:pPr algn="ctr"/>
+          </a:p>
+        </p:txBody>
+      </p:sp>
+      <p:sp>
+        <p:nvSpPr>
+          <p:cNvPr id="3" name="TextBox 2"/>
+          <p:cNvSpPr txBox="1"/>
+          <p:nvPr/>
+        </p:nvSpPr>
+        <p:spPr>
+          <a:xfrm>
+            <a:off x="914400" y="2286000"/>
+            <a:ext cx="7315200" cy="1828800"/>
+          </a:xfrm>
+          <a:prstGeom prst="rect">
+            <a:avLst/>
+          </a:prstGeom>
+          <a:noFill/>
+        </p:spPr>
+        <p:txBody>
+          <a:bodyPr wrap="none">
+            <a:spAutoFit/>
+          </a:bodyPr>
+          <a:lstStyle/>
+          <a:p>
+            <a:pPr algn="ctr">
+              <a:defRPr sz="4800" b="1">
+                <a:solidFill>
+                  <a:srgbClr val="FFFFFF"/>
+                </a:solidFill>
+              </a:defRPr>
+            </a:pPr>
+            <a:r>
+              <a:t>Thank You!</a:t>
+            </a:r>
+          </a:p>
+        </p:txBody>
+      </p:sp>
+      <p:sp>
+        <p:nvSpPr>
+          <p:cNvPr id="4" name="TextBox 3"/>
+          <p:cNvSpPr txBox="1"/>
+          <p:nvPr/>
+        </p:nvSpPr>
+        <p:spPr>
+          <a:xfrm>
+            <a:off x="914400" y="4572000"/>
+            <a:ext cx="7315200" cy="914400"/>
+          </a:xfrm>
+          <a:prstGeom prst="rect">
+            <a:avLst/>
+          </a:prstGeom>
+          <a:noFill/>
+        </p:spPr>
+        <p:txBody>
+          <a:bodyPr wrap="none">
+            <a:spAutoFit/>
+          </a:bodyPr>
+          <a:lstStyle/>
+          <a:p>
+            <a:pPr algn="ctr">
+              <a:defRPr sz="2400">
+                <a:solidFill>
+                  <a:srgbClr val="C8C8C8"/>
+                </a:solidFill>
+              </a:defRPr>
+            </a:pPr>
+            <a:r>
+              <a:t>Questions &amp; Discussion</a:t>
+            </a:r>
+          </a:p>
+        </p:txBody>
+      </p:sp>
+    </p:spTree>
+  </p:cSld>
+  <p:clrMapOvr>
+    <a:masterClrMapping/>
+  </p:clrMapOvr>
+</p:sld>
+</file>
+
 <file path=ppt/slides/slide2.xml><?xml version="1.0" encoding="utf-8"?>
 <p:sld xmlns:a="http://schemas.openxmlformats.org/drawingml/2006/main" xmlns:p="http://schemas.openxmlformats.org/presentationml/2006/main" xmlns:r="http://schemas.openxmlformats.org/officeDocument/2006/relationships">
   <p:cSld>
@@ -5931,7 +6237,7 @@
           <a:p>
             <a:pPr/>
             <a:r>
-              <a:t>Generative AI refers to a subset of artificial intelligence (AI) that focuses on creating new, original content such as images, music, videos, or text based on patterns and structures learned from existing data. This technology has numerous applications in various industries, including entertainment, education, and marketing. As generative AI continues to evolve, it raises interesting questions about creativity, authorship, and the future of human work.</a:t>
+              <a:t>Generative AI refers to the use of artificial intelligence algorithms that can generate new, original content such as images, music, and text. This field has seen significant advancements in recent years, with applications in various industries. In this presentation, we will explore the core concepts, applications, and future of generative AI.</a:t>
             </a:r>
           </a:p>
         </p:txBody>
@@ -6011,7 +6317,23 @@
               <a:defRPr sz="1400"/>
             </a:pPr>
             <a:r>
-              <a:t>Generative AI uses machine learning algorithms to generate new content that is unique and often indistinguishable from human-created work.</a:t>
+              <a:t>Definition</a:t>
+            </a:r>
+          </a:p>
+          <a:p>
+            <a:pPr>
+              <a:defRPr sz="1400"/>
+            </a:pPr>
+            <a:r>
+              <a:t>Types (Image, Music, Text)</a:t>
+            </a:r>
+          </a:p>
+          <a:p>
+            <a:pPr>
+              <a:defRPr sz="1400"/>
+            </a:pPr>
+            <a:r>
+              <a:t>Techniques (GANs, VAEs, RNNs)</a:t>
             </a:r>
           </a:p>
         </p:txBody>
@@ -6042,7 +6364,7 @@
               <a:defRPr sz="1400"/>
             </a:pPr>
             <a:r>
-              <a:t>These algorithms can learn from large datasets and identify patterns, allowing them to create new content that is coherent and contextually relevant.</a:t>
+              <a:t>Applications (Art, Music, Content Generation)</a:t>
             </a:r>
           </a:p>
           <a:p>
@@ -6050,7 +6372,15 @@
               <a:defRPr sz="1400"/>
             </a:pPr>
             <a:r>
-              <a:t>Generative AI can be applied to various tasks, including text generation, image synthesis, and music composition.</a:t>
+              <a:t>Limitations and Challenges</a:t>
+            </a:r>
+          </a:p>
+          <a:p>
+            <a:pPr>
+              <a:defRPr sz="1400"/>
+            </a:pPr>
+            <a:r>
+              <a:t>Potential Impact</a:t>
             </a:r>
           </a:p>
         </p:txBody>
@@ -6099,127 +6429,7 @@
               <a:defRPr sz="3200" b="1"/>
             </a:pPr>
             <a:r>
-              <a:t>Applications of Generative AI</a:t>
-            </a:r>
-          </a:p>
-        </p:txBody>
-      </p:sp>
-      <p:pic>
-        <p:nvPicPr>
-          <p:cNvPr id="3" name="Picture 2" descr="Applications of Generative AI_aVAHRUP7keU.jpg"/>
-          <p:cNvPicPr>
-            <a:picLocks noChangeAspect="1"/>
-          </p:cNvPicPr>
-          <p:nvPr/>
-        </p:nvPicPr>
-        <p:blipFill>
-          <a:blip r:embed="rId2"/>
-          <a:stretch>
-            <a:fillRect/>
-          </a:stretch>
-        </p:blipFill>
-        <p:spPr>
-          <a:xfrm>
-            <a:off x="457200" y="1371600"/>
-            <a:ext cx="4114800" cy="5029200"/>
-          </a:xfrm>
-          <a:prstGeom prst="rect">
-            <a:avLst/>
-          </a:prstGeom>
-        </p:spPr>
-      </p:pic>
-      <p:sp>
-        <p:nvSpPr>
-          <p:cNvPr id="4" name="TextBox 3"/>
-          <p:cNvSpPr txBox="1"/>
-          <p:nvPr/>
-        </p:nvSpPr>
-        <p:spPr>
-          <a:xfrm>
-            <a:off x="5029200" y="1371600"/>
-            <a:ext cx="4114800" cy="5029200"/>
-          </a:xfrm>
-          <a:prstGeom prst="rect">
-            <a:avLst/>
-          </a:prstGeom>
-          <a:noFill/>
-        </p:spPr>
-        <p:txBody>
-          <a:bodyPr wrap="square">
-            <a:spAutoFit/>
-          </a:bodyPr>
-          <a:lstStyle/>
-          <a:p>
-            <a:pPr>
-              <a:defRPr sz="1400"/>
-            </a:pPr>
-            <a:r>
-              <a:t>Generative AI has numerous applications in the entertainment industry, including the creation of realistic special effects, character animation, and video game assets.</a:t>
-            </a:r>
-          </a:p>
-          <a:p>
-            <a:pPr>
-              <a:defRPr sz="1400"/>
-            </a:pPr>
-            <a:r>
-              <a:t>In the education sector, generative AI can be used to create personalized learning materials, such as adaptive assessments and interactive simulations.</a:t>
-            </a:r>
-          </a:p>
-          <a:p>
-            <a:pPr>
-              <a:defRPr sz="1400"/>
-            </a:pPr>
-            <a:r>
-              <a:t>Generative AI also has significant potential in the marketing industry, enabling the creation of customized content, such as product descriptions and social media posts.</a:t>
-            </a:r>
-          </a:p>
-        </p:txBody>
-      </p:sp>
-    </p:spTree>
-  </p:cSld>
-  <p:clrMapOvr>
-    <a:masterClrMapping/>
-  </p:clrMapOvr>
-</p:sld>
-</file>
-
-<file path=ppt/slides/slide5.xml><?xml version="1.0" encoding="utf-8"?>
-<p:sld xmlns:a="http://schemas.openxmlformats.org/drawingml/2006/main" xmlns:p="http://schemas.openxmlformats.org/presentationml/2006/main" xmlns:r="http://schemas.openxmlformats.org/officeDocument/2006/relationships">
-  <p:cSld>
-    <p:spTree>
-      <p:nvGrpSpPr>
-        <p:cNvPr id="1" name=""/>
-        <p:cNvGrpSpPr/>
-        <p:nvPr/>
-      </p:nvGrpSpPr>
-      <p:grpSpPr/>
-      <p:sp>
-        <p:nvSpPr>
-          <p:cNvPr id="2" name="TextBox 1"/>
-          <p:cNvSpPr txBox="1"/>
-          <p:nvPr/>
-        </p:nvSpPr>
-        <p:spPr>
-          <a:xfrm>
-            <a:off x="457200" y="457200"/>
-            <a:ext cx="8229600" cy="914400"/>
-          </a:xfrm>
-          <a:prstGeom prst="rect">
-            <a:avLst/>
-          </a:prstGeom>
-          <a:noFill/>
-        </p:spPr>
-        <p:txBody>
-          <a:bodyPr wrap="none">
-            <a:spAutoFit/>
-          </a:bodyPr>
-          <a:lstStyle/>
-          <a:p>
-            <a:pPr>
-              <a:defRPr sz="3200" b="1"/>
-            </a:pPr>
-            <a:r>
-              <a:t>Benefits and Challenges</a:t>
+              <a:t>Core Concepts</a:t>
             </a:r>
           </a:p>
         </p:txBody>
@@ -6250,7 +6460,7 @@
               <a:defRPr sz="1400"/>
             </a:pPr>
             <a:r>
-              <a:t>The primary benefit of generative AI is its ability to automate time-consuming tasks, freeing up human creators to focus on high-level tasks and complex decision-making.</a:t>
+              <a:t>Generative Adversarial Networks (GANs)</a:t>
             </a:r>
           </a:p>
           <a:p>
@@ -6258,7 +6468,7 @@
               <a:defRPr sz="1400"/>
             </a:pPr>
             <a:r>
-              <a:t>However, generative AI also raises challenges related to ownership, authorship, and accountability, particularly in cases where AI-generated content is indistinguishable from human-created work.</a:t>
+              <a:t>Variational Autoencoders (VAEs)</a:t>
             </a:r>
           </a:p>
           <a:p>
@@ -6266,14 +6476,38 @@
               <a:defRPr sz="1400"/>
             </a:pPr>
             <a:r>
-              <a:t>Additionally, generative AI requires large amounts of data to learn and improve, which can be a significant challenge, especially in domains where high-quality data is scarce.</a:t>
+              <a:t>Recurrent Neural Networks (RNNs)</a:t>
+            </a:r>
+          </a:p>
+          <a:p>
+            <a:pPr>
+              <a:defRPr sz="1400"/>
+            </a:pPr>
+            <a:r>
+              <a:t>Deep Learning Architectures</a:t>
+            </a:r>
+          </a:p>
+          <a:p>
+            <a:pPr>
+              <a:defRPr sz="1400"/>
+            </a:pPr>
+            <a:r>
+              <a:t>Latent Space Representation</a:t>
+            </a:r>
+          </a:p>
+          <a:p>
+            <a:pPr>
+              <a:defRPr sz="1400"/>
+            </a:pPr>
+            <a:r>
+              <a:t>Optimization Techniques</a:t>
             </a:r>
           </a:p>
         </p:txBody>
       </p:sp>
       <p:pic>
         <p:nvPicPr>
-          <p:cNvPr id="4" name="Picture 3" descr="Benefits and Challenges_TafT8acbzHw.jpg"/>
+          <p:cNvPr id="4" name="Picture 3" descr="Core Concepts_huT1A8nW_Ho.jpg"/>
           <p:cNvPicPr>
             <a:picLocks noChangeAspect="1"/>
           </p:cNvPicPr>
@@ -6303,6 +6537,99 @@
 </p:sld>
 </file>
 
+<file path=ppt/slides/slide5.xml><?xml version="1.0" encoding="utf-8"?>
+<p:sld xmlns:a="http://schemas.openxmlformats.org/drawingml/2006/main" xmlns:p="http://schemas.openxmlformats.org/presentationml/2006/main" xmlns:r="http://schemas.openxmlformats.org/officeDocument/2006/relationships">
+  <p:cSld>
+    <p:spTree>
+      <p:nvGrpSpPr>
+        <p:cNvPr id="1" name=""/>
+        <p:cNvGrpSpPr/>
+        <p:nvPr/>
+      </p:nvGrpSpPr>
+      <p:grpSpPr/>
+      <p:sp>
+        <p:nvSpPr>
+          <p:cNvPr id="2" name="Title 1"/>
+          <p:cNvSpPr>
+            <a:spLocks noGrp="1"/>
+          </p:cNvSpPr>
+          <p:nvPr>
+            <p:ph type="title"/>
+          </p:nvPr>
+        </p:nvSpPr>
+        <p:spPr/>
+        <p:txBody>
+          <a:bodyPr/>
+          <a:lstStyle/>
+          <a:p>
+            <a:r>
+              <a:t>Applications in Art</a:t>
+            </a:r>
+          </a:p>
+        </p:txBody>
+      </p:sp>
+      <p:sp>
+        <p:nvSpPr>
+          <p:cNvPr id="3" name="Content Placeholder 2"/>
+          <p:cNvSpPr>
+            <a:spLocks noGrp="1"/>
+          </p:cNvSpPr>
+          <p:nvPr>
+            <p:ph idx="1"/>
+          </p:nvPr>
+        </p:nvSpPr>
+        <p:spPr/>
+        <p:txBody>
+          <a:bodyPr wrap="square">
+            <a:normAutofit/>
+          </a:bodyPr>
+          <a:lstStyle/>
+          <a:p>
+            <a:pPr/>
+            <a:r>
+              <a:t>Image Generation</a:t>
+            </a:r>
+          </a:p>
+          <a:p>
+            <a:pPr/>
+            <a:r>
+              <a:t>Artistic Style Transfer</a:t>
+            </a:r>
+          </a:p>
+          <a:p>
+            <a:pPr/>
+            <a:r>
+              <a:t>Music Composition</a:t>
+            </a:r>
+          </a:p>
+          <a:p>
+            <a:pPr/>
+            <a:r>
+              <a:t>Poetry and Writing</a:t>
+            </a:r>
+          </a:p>
+          <a:p>
+            <a:pPr/>
+            <a:r>
+              <a:t>Video Generation</a:t>
+            </a:r>
+          </a:p>
+          <a:p>
+            <a:pPr/>
+            <a:r>
+              <a:t>Digital Twins</a:t>
+            </a:r>
+          </a:p>
+        </p:txBody>
+      </p:sp>
+    </p:spTree>
+  </p:cSld>
+  <p:clrMapOvr>
+    <a:masterClrMapping/>
+  </p:clrMapOvr>
+</p:sld>
+</file>
+
 <file path=ppt/slides/slide6.xml><?xml version="1.0" encoding="utf-8"?>
 <p:sld xmlns:a="http://schemas.openxmlformats.org/drawingml/2006/main" xmlns:p="http://schemas.openxmlformats.org/presentationml/2006/main" xmlns:r="http://schemas.openxmlformats.org/officeDocument/2006/relationships">
   <p:cSld>
@@ -6315,6 +6642,99 @@
       <p:grpSpPr/>
       <p:sp>
         <p:nvSpPr>
+          <p:cNvPr id="2" name="Title 1"/>
+          <p:cNvSpPr>
+            <a:spLocks noGrp="1"/>
+          </p:cNvSpPr>
+          <p:nvPr>
+            <p:ph type="title"/>
+          </p:nvPr>
+        </p:nvSpPr>
+        <p:spPr/>
+        <p:txBody>
+          <a:bodyPr/>
+          <a:lstStyle/>
+          <a:p>
+            <a:r>
+              <a:t>Applications in Music</a:t>
+            </a:r>
+          </a:p>
+        </p:txBody>
+      </p:sp>
+      <p:sp>
+        <p:nvSpPr>
+          <p:cNvPr id="3" name="Content Placeholder 2"/>
+          <p:cNvSpPr>
+            <a:spLocks noGrp="1"/>
+          </p:cNvSpPr>
+          <p:nvPr>
+            <p:ph idx="1"/>
+          </p:nvPr>
+        </p:nvSpPr>
+        <p:spPr/>
+        <p:txBody>
+          <a:bodyPr wrap="square">
+            <a:normAutofit/>
+          </a:bodyPr>
+          <a:lstStyle/>
+          <a:p>
+            <a:pPr/>
+            <a:r>
+              <a:t>Music Composition</a:t>
+            </a:r>
+          </a:p>
+          <a:p>
+            <a:pPr/>
+            <a:r>
+              <a:t>Music Generation</a:t>
+            </a:r>
+          </a:p>
+          <a:p>
+            <a:pPr/>
+            <a:r>
+              <a:t>Audio Processing</a:t>
+            </a:r>
+          </a:p>
+          <a:p>
+            <a:pPr/>
+            <a:r>
+              <a:t>Emotional Analysis</a:t>
+            </a:r>
+          </a:p>
+          <a:p>
+            <a:pPr/>
+            <a:r>
+              <a:t>Music Recommendation</a:t>
+            </a:r>
+          </a:p>
+          <a:p>
+            <a:pPr/>
+            <a:r>
+              <a:t>Audio Dubbing</a:t>
+            </a:r>
+          </a:p>
+        </p:txBody>
+      </p:sp>
+    </p:spTree>
+  </p:cSld>
+  <p:clrMapOvr>
+    <a:masterClrMapping/>
+  </p:clrMapOvr>
+</p:sld>
+</file>
+
+<file path=ppt/slides/slide7.xml><?xml version="1.0" encoding="utf-8"?>
+<p:sld xmlns:a="http://schemas.openxmlformats.org/drawingml/2006/main" xmlns:p="http://schemas.openxmlformats.org/presentationml/2006/main" xmlns:r="http://schemas.openxmlformats.org/officeDocument/2006/relationships">
+  <p:cSld>
+    <p:spTree>
+      <p:nvGrpSpPr>
+        <p:cNvPr id="1" name=""/>
+        <p:cNvGrpSpPr/>
+        <p:nvPr/>
+      </p:nvGrpSpPr>
+      <p:grpSpPr/>
+      <p:sp>
+        <p:nvSpPr>
           <p:cNvPr id="2" name="TextBox 1"/>
           <p:cNvSpPr txBox="1"/>
           <p:nvPr/>
@@ -6339,7 +6759,7 @@
               <a:defRPr sz="3200" b="1"/>
             </a:pPr>
             <a:r>
-              <a:t>Future Directions</a:t>
+              <a:t>Applications in Content Generation</a:t>
             </a:r>
           </a:p>
         </p:txBody>
@@ -6370,7 +6790,7 @@
               <a:defRPr sz="1400"/>
             </a:pPr>
             <a:r>
-              <a:t>Researchers are actively exploring new applications of generative AI, including the creation of realistic virtual humans and the generation of novel scientific discoveries.</a:t>
+              <a:t>Text Summarization</a:t>
             </a:r>
           </a:p>
           <a:p>
@@ -6378,7 +6798,7 @@
               <a:defRPr sz="1400"/>
             </a:pPr>
             <a:r>
-              <a:t>The development of more advanced generative models, such as those capable of learning from multiple sources and adapting to new contexts, is also underway.</a:t>
+              <a:t>Article Generation</a:t>
             </a:r>
           </a:p>
           <a:p>
@@ -6386,14 +6806,38 @@
               <a:defRPr sz="1400"/>
             </a:pPr>
             <a:r>
-              <a:t>As generative AI continues to evolve, it is essential to address the social and ethical implications of this technology, ensuring that it benefits society as a whole.</a:t>
+              <a:t>Chatbots and Conversational AI</a:t>
+            </a:r>
+          </a:p>
+          <a:p>
+            <a:pPr>
+              <a:defRPr sz="1400"/>
+            </a:pPr>
+            <a:r>
+              <a:t>Product Description Generation</a:t>
+            </a:r>
+          </a:p>
+          <a:p>
+            <a:pPr>
+              <a:defRPr sz="1400"/>
+            </a:pPr>
+            <a:r>
+              <a:t>Social Media Content Creation</a:t>
+            </a:r>
+          </a:p>
+          <a:p>
+            <a:pPr>
+              <a:defRPr sz="1400"/>
+            </a:pPr>
+            <a:r>
+              <a:t>Language Translation</a:t>
             </a:r>
           </a:p>
         </p:txBody>
       </p:sp>
       <p:pic>
         <p:nvPicPr>
-          <p:cNvPr id="4" name="Picture 3" descr="Future Directions_YvvFRJgWShM.jpg"/>
+          <p:cNvPr id="4" name="Picture 3" descr="Applications in Content Generation_yxR8IGwm4e0.jpg"/>
           <p:cNvPicPr>
             <a:picLocks noChangeAspect="1"/>
           </p:cNvPicPr>
@@ -6423,7 +6867,100 @@
 </p:sld>
 </file>
 
-<file path=ppt/slides/slide7.xml><?xml version="1.0" encoding="utf-8"?>
+<file path=ppt/slides/slide8.xml><?xml version="1.0" encoding="utf-8"?>
+<p:sld xmlns:a="http://schemas.openxmlformats.org/drawingml/2006/main" xmlns:p="http://schemas.openxmlformats.org/presentationml/2006/main" xmlns:r="http://schemas.openxmlformats.org/officeDocument/2006/relationships">
+  <p:cSld>
+    <p:spTree>
+      <p:nvGrpSpPr>
+        <p:cNvPr id="1" name=""/>
+        <p:cNvGrpSpPr/>
+        <p:nvPr/>
+      </p:nvGrpSpPr>
+      <p:grpSpPr/>
+      <p:sp>
+        <p:nvSpPr>
+          <p:cNvPr id="2" name="Title 1"/>
+          <p:cNvSpPr>
+            <a:spLocks noGrp="1"/>
+          </p:cNvSpPr>
+          <p:nvPr>
+            <p:ph type="title"/>
+          </p:nvPr>
+        </p:nvSpPr>
+        <p:spPr/>
+        <p:txBody>
+          <a:bodyPr/>
+          <a:lstStyle/>
+          <a:p>
+            <a:r>
+              <a:t>Applications in Industry</a:t>
+            </a:r>
+          </a:p>
+        </p:txBody>
+      </p:sp>
+      <p:sp>
+        <p:nvSpPr>
+          <p:cNvPr id="3" name="Content Placeholder 2"/>
+          <p:cNvSpPr>
+            <a:spLocks noGrp="1"/>
+          </p:cNvSpPr>
+          <p:nvPr>
+            <p:ph idx="1"/>
+          </p:nvPr>
+        </p:nvSpPr>
+        <p:spPr/>
+        <p:txBody>
+          <a:bodyPr wrap="square">
+            <a:normAutofit/>
+          </a:bodyPr>
+          <a:lstStyle/>
+          <a:p>
+            <a:pPr/>
+            <a:r>
+              <a:t>Product Design</a:t>
+            </a:r>
+          </a:p>
+          <a:p>
+            <a:pPr/>
+            <a:r>
+              <a:t>Fashion Design</a:t>
+            </a:r>
+          </a:p>
+          <a:p>
+            <a:pPr/>
+            <a:r>
+              <a:t>Interior Design</a:t>
+            </a:r>
+          </a:p>
+          <a:p>
+            <a:pPr/>
+            <a:r>
+              <a:t>Architecture</a:t>
+            </a:r>
+          </a:p>
+          <a:p>
+            <a:pPr/>
+            <a:r>
+              <a:t>Engineering Design</a:t>
+            </a:r>
+          </a:p>
+          <a:p>
+            <a:pPr/>
+            <a:r>
+              <a:t>Scientific Visualization</a:t>
+            </a:r>
+          </a:p>
+        </p:txBody>
+      </p:sp>
+    </p:spTree>
+  </p:cSld>
+  <p:clrMapOvr>
+    <a:masterClrMapping/>
+  </p:clrMapOvr>
+</p:sld>
+</file>
+
+<file path=ppt/slides/slide9.xml><?xml version="1.0" encoding="utf-8"?>
 <p:sld xmlns:a="http://schemas.openxmlformats.org/drawingml/2006/main" xmlns:p="http://schemas.openxmlformats.org/presentationml/2006/main" xmlns:r="http://schemas.openxmlformats.org/officeDocument/2006/relationships">
   <p:cSld>
     <p:spTree>
@@ -6455,25 +6992,49 @@
           </a:bodyPr>
           <a:lstStyle/>
           <a:p>
-            <a:pPr algn="ctr">
+            <a:pPr>
               <a:defRPr sz="3200" b="1"/>
             </a:pPr>
             <a:r>
-              <a:t>Conclusion</a:t>
-            </a:r>
-          </a:p>
-        </p:txBody>
-      </p:sp>
-      <p:sp>
-        <p:nvSpPr>
-          <p:cNvPr id="3" name="TextBox 2"/>
+              <a:t>Future of Generative AI</a:t>
+            </a:r>
+          </a:p>
+        </p:txBody>
+      </p:sp>
+      <p:pic>
+        <p:nvPicPr>
+          <p:cNvPr id="3" name="Picture 2" descr="Future of Generative AI_iar-afB0QQw.jpg"/>
+          <p:cNvPicPr>
+            <a:picLocks noChangeAspect="1"/>
+          </p:cNvPicPr>
+          <p:nvPr/>
+        </p:nvPicPr>
+        <p:blipFill>
+          <a:blip r:embed="rId2"/>
+          <a:stretch>
+            <a:fillRect/>
+          </a:stretch>
+        </p:blipFill>
+        <p:spPr>
+          <a:xfrm>
+            <a:off x="457200" y="1371600"/>
+            <a:ext cx="4114800" cy="5029200"/>
+          </a:xfrm>
+          <a:prstGeom prst="rect">
+            <a:avLst/>
+          </a:prstGeom>
+        </p:spPr>
+      </p:pic>
+      <p:sp>
+        <p:nvSpPr>
+          <p:cNvPr id="4" name="TextBox 3"/>
           <p:cNvSpPr txBox="1"/>
           <p:nvPr/>
         </p:nvSpPr>
         <p:spPr>
           <a:xfrm>
-            <a:off x="914400" y="1828800"/>
-            <a:ext cx="7315200" cy="3657600"/>
+            <a:off x="5029200" y="1371600"/>
+            <a:ext cx="4114800" cy="5029200"/>
           </a:xfrm>
           <a:prstGeom prst="rect">
             <a:avLst/>
@@ -6481,155 +7042,56 @@
           <a:noFill/>
         </p:spPr>
         <p:txBody>
-          <a:bodyPr wrap="square" anchor="ctr">
+          <a:bodyPr wrap="square">
             <a:spAutoFit/>
           </a:bodyPr>
           <a:lstStyle/>
           <a:p>
-            <a:pPr algn="ctr">
-              <a:defRPr sz="2000"/>
+            <a:pPr>
+              <a:defRPr sz="1400"/>
             </a:pPr>
             <a:r>
-              <a:t>Generative AI has the potential to revolutionize various industries and aspects of our lives, but it also raises important questions about creativity, authorship, and accountability.</a:t>
-            </a:r>
-          </a:p>
-          <a:p>
-            <a:pPr algn="ctr">
-              <a:defRPr sz="2000"/>
+              <a:t>Advancements in Algorithms</a:t>
+            </a:r>
+          </a:p>
+          <a:p>
+            <a:pPr>
+              <a:defRPr sz="1400"/>
             </a:pPr>
             <a:r>
-              <a:t>As we move forward with generative AI, it is crucial to prioritize responsible development and deployment, ensuring that this technology benefits society and enhances human capabilities.</a:t>
-            </a:r>
-          </a:p>
-        </p:txBody>
-      </p:sp>
-    </p:spTree>
-  </p:cSld>
-  <p:clrMapOvr>
-    <a:masterClrMapping/>
-  </p:clrMapOvr>
-</p:sld>
-</file>
-
-<file path=ppt/slides/slide8.xml><?xml version="1.0" encoding="utf-8"?>
-<p:sld xmlns:a="http://schemas.openxmlformats.org/drawingml/2006/main" xmlns:p="http://schemas.openxmlformats.org/presentationml/2006/main" xmlns:r="http://schemas.openxmlformats.org/officeDocument/2006/relationships">
-  <p:cSld>
-    <p:spTree>
-      <p:nvGrpSpPr>
-        <p:cNvPr id="1" name=""/>
-        <p:cNvGrpSpPr/>
-        <p:nvPr/>
-      </p:nvGrpSpPr>
-      <p:grpSpPr/>
-      <p:sp>
-        <p:nvSpPr>
-          <p:cNvPr id="2" name="Rectangle 1"/>
-          <p:cNvSpPr/>
-          <p:nvPr/>
-        </p:nvSpPr>
-        <p:spPr>
-          <a:xfrm>
-            <a:off x="0" y="0"/>
-            <a:ext cx="12192000" cy="6858000"/>
-          </a:xfrm>
-          <a:prstGeom prst="rect">
-            <a:avLst/>
-          </a:prstGeom>
-          <a:solidFill>
-            <a:srgbClr val="191970"/>
-          </a:solidFill>
-          <a:ln>
-            <a:noFill/>
-          </a:ln>
-        </p:spPr>
-        <p:style>
-          <a:lnRef idx="1">
-            <a:schemeClr val="accent1"/>
-          </a:lnRef>
-          <a:fillRef idx="3">
-            <a:schemeClr val="accent1"/>
-          </a:fillRef>
-          <a:effectRef idx="2">
-            <a:schemeClr val="accent1"/>
-          </a:effectRef>
-          <a:fontRef idx="minor">
-            <a:schemeClr val="lt1"/>
-          </a:fontRef>
-        </p:style>
-        <p:txBody>
-          <a:bodyPr rtlCol="0" anchor="ctr"/>
-          <a:lstStyle/>
-          <a:p>
-            <a:pPr algn="ctr"/>
-          </a:p>
-        </p:txBody>
-      </p:sp>
-      <p:sp>
-        <p:nvSpPr>
-          <p:cNvPr id="3" name="TextBox 2"/>
-          <p:cNvSpPr txBox="1"/>
-          <p:nvPr/>
-        </p:nvSpPr>
-        <p:spPr>
-          <a:xfrm>
-            <a:off x="914400" y="2286000"/>
-            <a:ext cx="7315200" cy="1828800"/>
-          </a:xfrm>
-          <a:prstGeom prst="rect">
-            <a:avLst/>
-          </a:prstGeom>
-          <a:noFill/>
-        </p:spPr>
-        <p:txBody>
-          <a:bodyPr wrap="none">
-            <a:spAutoFit/>
-          </a:bodyPr>
-          <a:lstStyle/>
-          <a:p>
-            <a:pPr algn="ctr">
-              <a:defRPr sz="4800" b="1">
-                <a:solidFill>
-                  <a:srgbClr val="FFFFFF"/>
-                </a:solidFill>
-              </a:defRPr>
+              <a:t>Increased Computational Power</a:t>
+            </a:r>
+          </a:p>
+          <a:p>
+            <a:pPr>
+              <a:defRPr sz="1400"/>
             </a:pPr>
             <a:r>
-              <a:t>Thank You!</a:t>
-            </a:r>
-          </a:p>
-        </p:txBody>
-      </p:sp>
-      <p:sp>
-        <p:nvSpPr>
-          <p:cNvPr id="4" name="TextBox 3"/>
-          <p:cNvSpPr txBox="1"/>
-          <p:nvPr/>
-        </p:nvSpPr>
-        <p:spPr>
-          <a:xfrm>
-            <a:off x="914400" y="4572000"/>
-            <a:ext cx="7315200" cy="914400"/>
-          </a:xfrm>
-          <a:prstGeom prst="rect">
-            <a:avLst/>
-          </a:prstGeom>
-          <a:noFill/>
-        </p:spPr>
-        <p:txBody>
-          <a:bodyPr wrap="none">
-            <a:spAutoFit/>
-          </a:bodyPr>
-          <a:lstStyle/>
-          <a:p>
-            <a:pPr algn="ctr">
-              <a:defRPr sz="2400">
-                <a:solidFill>
-                  <a:srgbClr val="C8C8C8"/>
-                </a:solidFill>
-              </a:defRPr>
+              <a:t>Integration with Other AI Technologies</a:t>
+            </a:r>
+          </a:p>
+          <a:p>
+            <a:pPr>
+              <a:defRPr sz="1400"/>
             </a:pPr>
             <a:r>
-              <a:t>Questions &amp; Discussion</a:t>
+              <a:t>Ethical Considerations</a:t>
+            </a:r>
+          </a:p>
+          <a:p>
+            <a:pPr>
+              <a:defRPr sz="1400"/>
+            </a:pPr>
+            <a:r>
+              <a:t>Regulatory Frameworks</a:t>
+            </a:r>
+          </a:p>
+          <a:p>
+            <a:pPr>
+              <a:defRPr sz="1400"/>
+            </a:pPr>
+            <a:r>
+              <a:t>Societal Impact</a:t>
             </a:r>
           </a:p>
         </p:txBody>
@@ -6659,28 +7121,28 @@
         <a:srgbClr val="EBEBEB"/>
       </a:lt2>
       <a:accent1>
-        <a:srgbClr val="F496CB"/>
+        <a:srgbClr val="90C226"/>
       </a:accent1>
       <a:accent2>
-        <a:srgbClr val="BC356F"/>
+        <a:srgbClr val="54A021"/>
       </a:accent2>
       <a:accent3>
-        <a:srgbClr val="E65331"/>
+        <a:srgbClr val="E6B91E"/>
       </a:accent3>
       <a:accent4>
-        <a:srgbClr val="F27E19"/>
+        <a:srgbClr val="E76618"/>
       </a:accent4>
       <a:accent5>
-        <a:srgbClr val="F2AC19"/>
+        <a:srgbClr val="C42F1A"/>
       </a:accent5>
       <a:accent6>
-        <a:srgbClr val="BC80E0"/>
+        <a:srgbClr val="918655"/>
       </a:accent6>
       <a:hlink>
-        <a:srgbClr val="EF5285"/>
+        <a:srgbClr val="99CA3C"/>
       </a:hlink>
       <a:folHlink>
-        <a:srgbClr val="F77F90"/>
+        <a:srgbClr val="B9D181"/>
       </a:folHlink>
     </a:clrScheme>
     <a:fontScheme name="Facet">
@@ -6755,7 +7217,7 @@
         <a:font script="Geor" typeface="Sylfaen"/>
       </a:minorFont>
     </a:fontScheme>
-    <a:fmtScheme name="Inset">
+    <a:fmtScheme name="Facet">
       <a:fillStyleLst>
         <a:solidFill>
           <a:schemeClr val="phClr"/>
@@ -6764,38 +7226,30 @@
           <a:gsLst>
             <a:gs pos="0">
               <a:schemeClr val="phClr">
-                <a:tint val="20000"/>
-                <a:satMod val="180000"/>
-                <a:lumMod val="98000"/>
+                <a:tint val="65000"/>
+                <a:lumMod val="110000"/>
               </a:schemeClr>
             </a:gs>
-            <a:gs pos="40000">
+            <a:gs pos="88000">
               <a:schemeClr val="phClr">
-                <a:tint val="30000"/>
-                <a:satMod val="260000"/>
-                <a:lumMod val="84000"/>
-              </a:schemeClr>
-            </a:gs>
-            <a:gs pos="100000">
-              <a:schemeClr val="phClr">
-                <a:tint val="100000"/>
-                <a:satMod val="110000"/>
-                <a:lumMod val="100000"/>
+                <a:tint val="90000"/>
               </a:schemeClr>
             </a:gs>
           </a:gsLst>
-          <a:lin ang="5040000" scaled="1"/>
+          <a:lin ang="5400000" scaled="0"/>
         </a:gradFill>
         <a:gradFill rotWithShape="1">
           <a:gsLst>
             <a:gs pos="0">
-              <a:schemeClr val="phClr"/>
+              <a:schemeClr val="phClr">
+                <a:tint val="96000"/>
+                <a:lumMod val="100000"/>
+              </a:schemeClr>
             </a:gs>
-            <a:gs pos="100000">
+            <a:gs pos="78000">
               <a:schemeClr val="phClr">
-                <a:shade val="75000"/>
-                <a:satMod val="120000"/>
-                <a:lumMod val="90000"/>
+                <a:shade val="94000"/>
+                <a:lumMod val="94000"/>
               </a:schemeClr>
             </a:gs>
           </a:gsLst>
@@ -6803,19 +7257,19 @@
         </a:gradFill>
       </a:fillStyleLst>
       <a:lnStyleLst>
-        <a:ln w="9525" cap="flat" cmpd="sng" algn="ctr">
+        <a:ln w="12700" cap="rnd" cmpd="sng" algn="ctr">
           <a:solidFill>
             <a:schemeClr val="phClr"/>
           </a:solidFill>
           <a:prstDash val="solid"/>
         </a:ln>
-        <a:ln w="15875" cap="flat" cmpd="sng" algn="ctr">
+        <a:ln w="19050" cap="rnd" cmpd="sng" algn="ctr">
           <a:solidFill>
             <a:schemeClr val="phClr"/>
           </a:solidFill>
           <a:prstDash val="solid"/>
         </a:ln>
-        <a:ln w="22225" cap="flat" cmpd="sng" algn="ctr">
+        <a:ln w="25400" cap="rnd" cmpd="sng" algn="ctr">
           <a:solidFill>
             <a:schemeClr val="phClr"/>
           </a:solidFill>
@@ -6828,9 +7282,18 @@
         </a:effectStyle>
         <a:effectStyle>
           <a:effectLst>
-            <a:outerShdw blurRad="50800" dist="25400" dir="5400000" rotWithShape="0">
+            <a:outerShdw blurRad="38100" dist="25400" dir="5400000" rotWithShape="0">
               <a:srgbClr val="000000">
-                <a:alpha val="28000"/>
+                <a:alpha val="35000"/>
+              </a:srgbClr>
+            </a:outerShdw>
+          </a:effectLst>
+        </a:effectStyle>
+        <a:effectStyle>
+          <a:effectLst>
+            <a:outerShdw blurRad="50800" dist="38100" dir="5400000" rotWithShape="0">
+              <a:srgbClr val="000000">
+                <a:alpha val="35000"/>
               </a:srgbClr>
             </a:outerShdw>
           </a:effectLst>
@@ -6838,37 +7301,10 @@
             <a:camera prst="orthographicFront">
               <a:rot lat="0" lon="0" rev="0"/>
             </a:camera>
-            <a:lightRig rig="threePt" dir="tl">
-              <a:rot lat="0" lon="0" rev="20400000"/>
-            </a:lightRig>
+            <a:lightRig rig="threePt" dir="tl"/>
           </a:scene3d>
-          <a:sp3d>
-            <a:bevelT w="50800" h="12700" prst="softRound"/>
-          </a:sp3d>
-        </a:effectStyle>
-        <a:effectStyle>
-          <a:effectLst>
-            <a:outerShdw blurRad="44450" dist="50800" dir="5400000" sx="96000" rotWithShape="0">
-              <a:srgbClr val="000000">
-                <a:alpha val="34000"/>
-              </a:srgbClr>
-            </a:outerShdw>
-          </a:effectLst>
-          <a:scene3d>
-            <a:camera prst="orthographicFront">
-              <a:rot lat="0" lon="0" rev="0"/>
-            </a:camera>
-            <a:lightRig rig="threePt" dir="tl">
-              <a:rot lat="0" lon="0" rev="20400000"/>
-            </a:lightRig>
-          </a:scene3d>
-          <a:sp3d contourW="15875">
-            <a:bevelT w="101600" h="25400" prst="softRound"/>
-            <a:contourClr>
-              <a:schemeClr val="phClr">
-                <a:shade val="30000"/>
-              </a:schemeClr>
-            </a:contourClr>
+          <a:sp3d prstMaterial="plastic">
+            <a:bevelT w="0" h="0"/>
           </a:sp3d>
         </a:effectStyle>
       </a:effectStyleLst>
@@ -6919,7 +7355,7 @@
   <a:extraClrSchemeLst/>
   <a:extLst>
     <a:ext uri="{05A4C25C-085E-4340-85A3-A5531E510DB2}">
-      <thm15:themeFamily xmlns:thm15="http://schemas.microsoft.com/office/thememl/2012/main" name="Facet" id="{C0C680CD-088A-49FC-A102-D699147F32B2}" vid="{23659B44-6E34-4CE8-8F0D-387DA7996826}"/>
+      <thm15:themeFamily xmlns:thm15="http://schemas.microsoft.com/office/thememl/2012/main" name="Facet" id="{C0C680CD-088A-49FC-A102-D699147F32B2}" vid="{8C59B386-999D-4CB6-B907-9F3997C027CC}"/>
     </a:ext>
   </a:extLst>
 </a:theme>

</xml_diff>